<commit_message>
Added data classes to the presentation
</commit_message>
<xml_diff>
--- a/2019-02-20_hettinger_mypy_and_type_hinting.pptx
+++ b/2019-02-20_hettinger_mypy_and_type_hinting.pptx
@@ -15,11 +15,16 @@
     <p:sldId id="264" r:id="rId9"/>
     <p:sldId id="265" r:id="rId10"/>
     <p:sldId id="263" r:id="rId11"/>
-    <p:sldId id="267" r:id="rId12"/>
-    <p:sldId id="268" r:id="rId13"/>
-    <p:sldId id="262" r:id="rId14"/>
-    <p:sldId id="270" r:id="rId15"/>
-    <p:sldId id="269" r:id="rId16"/>
+    <p:sldId id="276" r:id="rId12"/>
+    <p:sldId id="273" r:id="rId13"/>
+    <p:sldId id="274" r:id="rId14"/>
+    <p:sldId id="275" r:id="rId15"/>
+    <p:sldId id="267" r:id="rId16"/>
+    <p:sldId id="268" r:id="rId17"/>
+    <p:sldId id="262" r:id="rId18"/>
+    <p:sldId id="270" r:id="rId19"/>
+    <p:sldId id="269" r:id="rId20"/>
+    <p:sldId id="271" r:id="rId21"/>
   </p:sldIdLst>
   <p:sldSz cx="12192000" cy="6858000"/>
   <p:notesSz cx="6858000" cy="9144000"/>
@@ -836,7 +841,7 @@
           <a:p>
             <a:fld id="{C7FEF55F-DBD5-40CF-AB25-8456F77D4467}" type="datetimeFigureOut">
               <a:rPr lang="en-CA" smtClean="0"/>
-              <a:t>2019-02-20</a:t>
+              <a:t>2019-02-23</a:t>
             </a:fld>
             <a:endParaRPr lang="en-CA"/>
           </a:p>
@@ -1036,7 +1041,7 @@
           <a:p>
             <a:fld id="{C7FEF55F-DBD5-40CF-AB25-8456F77D4467}" type="datetimeFigureOut">
               <a:rPr lang="en-CA" smtClean="0"/>
-              <a:t>2019-02-20</a:t>
+              <a:t>2019-02-23</a:t>
             </a:fld>
             <a:endParaRPr lang="en-CA"/>
           </a:p>
@@ -1246,7 +1251,7 @@
           <a:p>
             <a:fld id="{C7FEF55F-DBD5-40CF-AB25-8456F77D4467}" type="datetimeFigureOut">
               <a:rPr lang="en-CA" smtClean="0"/>
-              <a:t>2019-02-20</a:t>
+              <a:t>2019-02-23</a:t>
             </a:fld>
             <a:endParaRPr lang="en-CA"/>
           </a:p>
@@ -1446,7 +1451,7 @@
           <a:p>
             <a:fld id="{C7FEF55F-DBD5-40CF-AB25-8456F77D4467}" type="datetimeFigureOut">
               <a:rPr lang="en-CA" smtClean="0"/>
-              <a:t>2019-02-20</a:t>
+              <a:t>2019-02-23</a:t>
             </a:fld>
             <a:endParaRPr lang="en-CA"/>
           </a:p>
@@ -1722,7 +1727,7 @@
           <a:p>
             <a:fld id="{C7FEF55F-DBD5-40CF-AB25-8456F77D4467}" type="datetimeFigureOut">
               <a:rPr lang="en-CA" smtClean="0"/>
-              <a:t>2019-02-20</a:t>
+              <a:t>2019-02-23</a:t>
             </a:fld>
             <a:endParaRPr lang="en-CA"/>
           </a:p>
@@ -1990,7 +1995,7 @@
           <a:p>
             <a:fld id="{C7FEF55F-DBD5-40CF-AB25-8456F77D4467}" type="datetimeFigureOut">
               <a:rPr lang="en-CA" smtClean="0"/>
-              <a:t>2019-02-20</a:t>
+              <a:t>2019-02-23</a:t>
             </a:fld>
             <a:endParaRPr lang="en-CA"/>
           </a:p>
@@ -2405,7 +2410,7 @@
           <a:p>
             <a:fld id="{C7FEF55F-DBD5-40CF-AB25-8456F77D4467}" type="datetimeFigureOut">
               <a:rPr lang="en-CA" smtClean="0"/>
-              <a:t>2019-02-20</a:t>
+              <a:t>2019-02-23</a:t>
             </a:fld>
             <a:endParaRPr lang="en-CA"/>
           </a:p>
@@ -2547,7 +2552,7 @@
           <a:p>
             <a:fld id="{C7FEF55F-DBD5-40CF-AB25-8456F77D4467}" type="datetimeFigureOut">
               <a:rPr lang="en-CA" smtClean="0"/>
-              <a:t>2019-02-20</a:t>
+              <a:t>2019-02-23</a:t>
             </a:fld>
             <a:endParaRPr lang="en-CA"/>
           </a:p>
@@ -2660,7 +2665,7 @@
           <a:p>
             <a:fld id="{C7FEF55F-DBD5-40CF-AB25-8456F77D4467}" type="datetimeFigureOut">
               <a:rPr lang="en-CA" smtClean="0"/>
-              <a:t>2019-02-20</a:t>
+              <a:t>2019-02-23</a:t>
             </a:fld>
             <a:endParaRPr lang="en-CA"/>
           </a:p>
@@ -2973,7 +2978,7 @@
           <a:p>
             <a:fld id="{C7FEF55F-DBD5-40CF-AB25-8456F77D4467}" type="datetimeFigureOut">
               <a:rPr lang="en-CA" smtClean="0"/>
-              <a:t>2019-02-20</a:t>
+              <a:t>2019-02-23</a:t>
             </a:fld>
             <a:endParaRPr lang="en-CA"/>
           </a:p>
@@ -3262,7 +3267,7 @@
           <a:p>
             <a:fld id="{C7FEF55F-DBD5-40CF-AB25-8456F77D4467}" type="datetimeFigureOut">
               <a:rPr lang="en-CA" smtClean="0"/>
-              <a:t>2019-02-20</a:t>
+              <a:t>2019-02-23</a:t>
             </a:fld>
             <a:endParaRPr lang="en-CA"/>
           </a:p>
@@ -3505,7 +3510,7 @@
           <a:p>
             <a:fld id="{C7FEF55F-DBD5-40CF-AB25-8456F77D4467}" type="datetimeFigureOut">
               <a:rPr lang="en-CA" smtClean="0"/>
-              <a:t>2019-02-20</a:t>
+              <a:t>2019-02-23</a:t>
             </a:fld>
             <a:endParaRPr lang="en-CA"/>
           </a:p>
@@ -4234,6 +4239,424 @@
           <p:cNvPr id="2" name="Title 1">
             <a:extLst>
               <a:ext uri="{FF2B5EF4-FFF2-40B4-BE49-F238E27FC236}">
+                <a16:creationId xmlns:a16="http://schemas.microsoft.com/office/drawing/2014/main" id="{DAFADA02-72FF-4D86-952F-4343831214FD}"/>
+              </a:ext>
+            </a:extLst>
+          </p:cNvPr>
+          <p:cNvSpPr>
+            <a:spLocks noGrp="1"/>
+          </p:cNvSpPr>
+          <p:nvPr>
+            <p:ph type="ctrTitle"/>
+          </p:nvPr>
+        </p:nvSpPr>
+        <p:spPr/>
+        <p:txBody>
+          <a:bodyPr/>
+          <a:lstStyle/>
+          <a:p>
+            <a:r>
+              <a:rPr lang="en-CA" dirty="0"/>
+              <a:t>Python Features that </a:t>
+            </a:r>
+            <a:br>
+              <a:rPr lang="en-CA" dirty="0"/>
+            </a:br>
+            <a:r>
+              <a:rPr lang="en-CA" dirty="0"/>
+              <a:t>Require Type Hints</a:t>
+            </a:r>
+          </a:p>
+        </p:txBody>
+      </p:sp>
+      <p:sp>
+        <p:nvSpPr>
+          <p:cNvPr id="3" name="Subtitle 2">
+            <a:extLst>
+              <a:ext uri="{FF2B5EF4-FFF2-40B4-BE49-F238E27FC236}">
+                <a16:creationId xmlns:a16="http://schemas.microsoft.com/office/drawing/2014/main" id="{B020DC9B-3C8D-486A-BFFA-C6032C265E6F}"/>
+              </a:ext>
+            </a:extLst>
+          </p:cNvPr>
+          <p:cNvSpPr>
+            <a:spLocks noGrp="1"/>
+          </p:cNvSpPr>
+          <p:nvPr>
+            <p:ph type="subTitle" idx="1"/>
+          </p:nvPr>
+        </p:nvSpPr>
+        <p:spPr/>
+        <p:txBody>
+          <a:bodyPr/>
+          <a:lstStyle/>
+          <a:p>
+            <a:endParaRPr lang="en-CA"/>
+          </a:p>
+        </p:txBody>
+      </p:sp>
+    </p:spTree>
+    <p:extLst>
+      <p:ext uri="{BB962C8B-B14F-4D97-AF65-F5344CB8AC3E}">
+        <p14:creationId xmlns:p14="http://schemas.microsoft.com/office/powerpoint/2010/main" val="2406345884"/>
+      </p:ext>
+    </p:extLst>
+  </p:cSld>
+  <p:clrMapOvr>
+    <a:masterClrMapping/>
+  </p:clrMapOvr>
+</p:sld>
+</file>
+
+<file path=ppt/slides/slide12.xml><?xml version="1.0" encoding="utf-8"?>
+<p:sld xmlns:a="http://schemas.openxmlformats.org/drawingml/2006/main" xmlns:r="http://schemas.openxmlformats.org/officeDocument/2006/relationships" xmlns:p="http://schemas.openxmlformats.org/presentationml/2006/main">
+  <p:cSld>
+    <p:spTree>
+      <p:nvGrpSpPr>
+        <p:cNvPr id="1" name=""/>
+        <p:cNvGrpSpPr/>
+        <p:nvPr/>
+      </p:nvGrpSpPr>
+      <p:grpSpPr>
+        <a:xfrm>
+          <a:off x="0" y="0"/>
+          <a:ext cx="0" cy="0"/>
+          <a:chOff x="0" y="0"/>
+          <a:chExt cx="0" cy="0"/>
+        </a:xfrm>
+      </p:grpSpPr>
+      <p:sp>
+        <p:nvSpPr>
+          <p:cNvPr id="2" name="Title 1">
+            <a:extLst>
+              <a:ext uri="{FF2B5EF4-FFF2-40B4-BE49-F238E27FC236}">
+                <a16:creationId xmlns:a16="http://schemas.microsoft.com/office/drawing/2014/main" id="{949FABA7-A6CA-47CC-A1A5-384DB5D6435B}"/>
+              </a:ext>
+            </a:extLst>
+          </p:cNvPr>
+          <p:cNvSpPr>
+            <a:spLocks noGrp="1"/>
+          </p:cNvSpPr>
+          <p:nvPr>
+            <p:ph type="title"/>
+          </p:nvPr>
+        </p:nvSpPr>
+        <p:spPr/>
+        <p:txBody>
+          <a:bodyPr/>
+          <a:lstStyle/>
+          <a:p>
+            <a:r>
+              <a:rPr lang="en-CA" dirty="0" err="1"/>
+              <a:t>Dataclasses</a:t>
+            </a:r>
+            <a:endParaRPr lang="en-CA" dirty="0"/>
+          </a:p>
+        </p:txBody>
+      </p:sp>
+      <p:pic>
+        <p:nvPicPr>
+          <p:cNvPr id="4" name="Content Placeholder 3">
+            <a:extLst>
+              <a:ext uri="{FF2B5EF4-FFF2-40B4-BE49-F238E27FC236}">
+                <a16:creationId xmlns:a16="http://schemas.microsoft.com/office/drawing/2014/main" id="{C63F794E-34E1-4DF0-9BF2-F8D19DB57B51}"/>
+              </a:ext>
+            </a:extLst>
+          </p:cNvPr>
+          <p:cNvPicPr>
+            <a:picLocks noGrp="1" noChangeAspect="1"/>
+          </p:cNvPicPr>
+          <p:nvPr>
+            <p:ph idx="1"/>
+          </p:nvPr>
+        </p:nvPicPr>
+        <p:blipFill>
+          <a:blip r:embed="rId2"/>
+          <a:stretch>
+            <a:fillRect/>
+          </a:stretch>
+        </p:blipFill>
+        <p:spPr>
+          <a:xfrm>
+            <a:off x="204674" y="1832207"/>
+            <a:ext cx="5715798" cy="3886742"/>
+          </a:xfrm>
+          <a:prstGeom prst="rect">
+            <a:avLst/>
+          </a:prstGeom>
+        </p:spPr>
+      </p:pic>
+      <p:pic>
+        <p:nvPicPr>
+          <p:cNvPr id="5" name="Picture 4">
+            <a:extLst>
+              <a:ext uri="{FF2B5EF4-FFF2-40B4-BE49-F238E27FC236}">
+                <a16:creationId xmlns:a16="http://schemas.microsoft.com/office/drawing/2014/main" id="{19A232F4-6675-49B0-9216-8584ABBAD283}"/>
+              </a:ext>
+            </a:extLst>
+          </p:cNvPr>
+          <p:cNvPicPr>
+            <a:picLocks noChangeAspect="1"/>
+          </p:cNvPicPr>
+          <p:nvPr/>
+        </p:nvPicPr>
+        <p:blipFill>
+          <a:blip r:embed="rId3"/>
+          <a:stretch>
+            <a:fillRect/>
+          </a:stretch>
+        </p:blipFill>
+        <p:spPr>
+          <a:xfrm>
+            <a:off x="6176265" y="1832207"/>
+            <a:ext cx="5811061" cy="4505954"/>
+          </a:xfrm>
+          <a:prstGeom prst="rect">
+            <a:avLst/>
+          </a:prstGeom>
+        </p:spPr>
+      </p:pic>
+    </p:spTree>
+    <p:extLst>
+      <p:ext uri="{BB962C8B-B14F-4D97-AF65-F5344CB8AC3E}">
+        <p14:creationId xmlns:p14="http://schemas.microsoft.com/office/powerpoint/2010/main" val="1274483146"/>
+      </p:ext>
+    </p:extLst>
+  </p:cSld>
+  <p:clrMapOvr>
+    <a:masterClrMapping/>
+  </p:clrMapOvr>
+</p:sld>
+</file>
+
+<file path=ppt/slides/slide13.xml><?xml version="1.0" encoding="utf-8"?>
+<p:sld xmlns:a="http://schemas.openxmlformats.org/drawingml/2006/main" xmlns:r="http://schemas.openxmlformats.org/officeDocument/2006/relationships" xmlns:p="http://schemas.openxmlformats.org/presentationml/2006/main">
+  <p:cSld>
+    <p:spTree>
+      <p:nvGrpSpPr>
+        <p:cNvPr id="1" name=""/>
+        <p:cNvGrpSpPr/>
+        <p:nvPr/>
+      </p:nvGrpSpPr>
+      <p:grpSpPr>
+        <a:xfrm>
+          <a:off x="0" y="0"/>
+          <a:ext cx="0" cy="0"/>
+          <a:chOff x="0" y="0"/>
+          <a:chExt cx="0" cy="0"/>
+        </a:xfrm>
+      </p:grpSpPr>
+      <p:sp>
+        <p:nvSpPr>
+          <p:cNvPr id="2" name="Title 1">
+            <a:extLst>
+              <a:ext uri="{FF2B5EF4-FFF2-40B4-BE49-F238E27FC236}">
+                <a16:creationId xmlns:a16="http://schemas.microsoft.com/office/drawing/2014/main" id="{E2CBEF38-0986-4316-A5E1-4118D00CD96A}"/>
+              </a:ext>
+            </a:extLst>
+          </p:cNvPr>
+          <p:cNvSpPr>
+            <a:spLocks noGrp="1"/>
+          </p:cNvSpPr>
+          <p:nvPr>
+            <p:ph type="title"/>
+          </p:nvPr>
+        </p:nvSpPr>
+        <p:spPr/>
+        <p:txBody>
+          <a:bodyPr/>
+          <a:lstStyle/>
+          <a:p>
+            <a:r>
+              <a:rPr lang="en-CA" dirty="0" err="1"/>
+              <a:t>Dataclasses</a:t>
+            </a:r>
+            <a:r>
+              <a:rPr lang="en-CA" dirty="0"/>
+              <a:t> optionally supply many methods</a:t>
+            </a:r>
+          </a:p>
+        </p:txBody>
+      </p:sp>
+      <p:sp>
+        <p:nvSpPr>
+          <p:cNvPr id="9" name="Content Placeholder 8">
+            <a:extLst>
+              <a:ext uri="{FF2B5EF4-FFF2-40B4-BE49-F238E27FC236}">
+                <a16:creationId xmlns:a16="http://schemas.microsoft.com/office/drawing/2014/main" id="{0599F027-7006-4E15-A369-34F8A7E79754}"/>
+              </a:ext>
+            </a:extLst>
+          </p:cNvPr>
+          <p:cNvSpPr>
+            <a:spLocks noGrp="1"/>
+          </p:cNvSpPr>
+          <p:nvPr>
+            <p:ph idx="1"/>
+          </p:nvPr>
+        </p:nvSpPr>
+        <p:spPr/>
+        <p:txBody>
+          <a:bodyPr/>
+          <a:lstStyle/>
+          <a:p>
+            <a:endParaRPr lang="en-CA"/>
+          </a:p>
+        </p:txBody>
+      </p:sp>
+      <p:pic>
+        <p:nvPicPr>
+          <p:cNvPr id="10" name="Picture 9">
+            <a:extLst>
+              <a:ext uri="{FF2B5EF4-FFF2-40B4-BE49-F238E27FC236}">
+                <a16:creationId xmlns:a16="http://schemas.microsoft.com/office/drawing/2014/main" id="{B3108739-5BC5-4715-AF07-C4300A070A2C}"/>
+              </a:ext>
+            </a:extLst>
+          </p:cNvPr>
+          <p:cNvPicPr>
+            <a:picLocks noChangeAspect="1"/>
+          </p:cNvPicPr>
+          <p:nvPr/>
+        </p:nvPicPr>
+        <p:blipFill>
+          <a:blip r:embed="rId2"/>
+          <a:stretch>
+            <a:fillRect/>
+          </a:stretch>
+        </p:blipFill>
+        <p:spPr>
+          <a:xfrm>
+            <a:off x="322008" y="2633770"/>
+            <a:ext cx="11547984" cy="2735048"/>
+          </a:xfrm>
+          <a:prstGeom prst="rect">
+            <a:avLst/>
+          </a:prstGeom>
+        </p:spPr>
+      </p:pic>
+    </p:spTree>
+    <p:extLst>
+      <p:ext uri="{BB962C8B-B14F-4D97-AF65-F5344CB8AC3E}">
+        <p14:creationId xmlns:p14="http://schemas.microsoft.com/office/powerpoint/2010/main" val="1846945465"/>
+      </p:ext>
+    </p:extLst>
+  </p:cSld>
+  <p:clrMapOvr>
+    <a:masterClrMapping/>
+  </p:clrMapOvr>
+</p:sld>
+</file>
+
+<file path=ppt/slides/slide14.xml><?xml version="1.0" encoding="utf-8"?>
+<p:sld xmlns:a="http://schemas.openxmlformats.org/drawingml/2006/main" xmlns:r="http://schemas.openxmlformats.org/officeDocument/2006/relationships" xmlns:p="http://schemas.openxmlformats.org/presentationml/2006/main">
+  <p:cSld>
+    <p:spTree>
+      <p:nvGrpSpPr>
+        <p:cNvPr id="1" name=""/>
+        <p:cNvGrpSpPr/>
+        <p:nvPr/>
+      </p:nvGrpSpPr>
+      <p:grpSpPr>
+        <a:xfrm>
+          <a:off x="0" y="0"/>
+          <a:ext cx="0" cy="0"/>
+          <a:chOff x="0" y="0"/>
+          <a:chExt cx="0" cy="0"/>
+        </a:xfrm>
+      </p:grpSpPr>
+      <p:sp>
+        <p:nvSpPr>
+          <p:cNvPr id="2" name="Title 1">
+            <a:extLst>
+              <a:ext uri="{FF2B5EF4-FFF2-40B4-BE49-F238E27FC236}">
+                <a16:creationId xmlns:a16="http://schemas.microsoft.com/office/drawing/2014/main" id="{7D40C22A-C450-44A4-8AA8-71D9DD4A11E3}"/>
+              </a:ext>
+            </a:extLst>
+          </p:cNvPr>
+          <p:cNvSpPr>
+            <a:spLocks noGrp="1"/>
+          </p:cNvSpPr>
+          <p:nvPr>
+            <p:ph type="title"/>
+          </p:nvPr>
+        </p:nvSpPr>
+        <p:spPr/>
+        <p:txBody>
+          <a:bodyPr/>
+          <a:lstStyle/>
+          <a:p>
+            <a:r>
+              <a:rPr lang="en-CA" dirty="0"/>
+              <a:t>Named Tuples with Type Hints </a:t>
+            </a:r>
+          </a:p>
+        </p:txBody>
+      </p:sp>
+      <p:pic>
+        <p:nvPicPr>
+          <p:cNvPr id="5" name="Content Placeholder 4">
+            <a:extLst>
+              <a:ext uri="{FF2B5EF4-FFF2-40B4-BE49-F238E27FC236}">
+                <a16:creationId xmlns:a16="http://schemas.microsoft.com/office/drawing/2014/main" id="{0EAC1A77-94AC-4857-A8A3-F741837DFC7F}"/>
+              </a:ext>
+            </a:extLst>
+          </p:cNvPr>
+          <p:cNvPicPr>
+            <a:picLocks noGrp="1" noChangeAspect="1"/>
+          </p:cNvPicPr>
+          <p:nvPr>
+            <p:ph idx="1"/>
+          </p:nvPr>
+        </p:nvPicPr>
+        <p:blipFill>
+          <a:blip r:embed="rId2"/>
+          <a:stretch>
+            <a:fillRect/>
+          </a:stretch>
+        </p:blipFill>
+        <p:spPr>
+          <a:xfrm>
+            <a:off x="2468195" y="1902830"/>
+            <a:ext cx="7255610" cy="4406547"/>
+          </a:xfrm>
+          <a:prstGeom prst="rect">
+            <a:avLst/>
+          </a:prstGeom>
+        </p:spPr>
+      </p:pic>
+    </p:spTree>
+    <p:extLst>
+      <p:ext uri="{BB962C8B-B14F-4D97-AF65-F5344CB8AC3E}">
+        <p14:creationId xmlns:p14="http://schemas.microsoft.com/office/powerpoint/2010/main" val="3320430724"/>
+      </p:ext>
+    </p:extLst>
+  </p:cSld>
+  <p:clrMapOvr>
+    <a:masterClrMapping/>
+  </p:clrMapOvr>
+</p:sld>
+</file>
+
+<file path=ppt/slides/slide15.xml><?xml version="1.0" encoding="utf-8"?>
+<p:sld xmlns:a="http://schemas.openxmlformats.org/drawingml/2006/main" xmlns:r="http://schemas.openxmlformats.org/officeDocument/2006/relationships" xmlns:p="http://schemas.openxmlformats.org/presentationml/2006/main">
+  <p:cSld>
+    <p:spTree>
+      <p:nvGrpSpPr>
+        <p:cNvPr id="1" name=""/>
+        <p:cNvGrpSpPr/>
+        <p:nvPr/>
+      </p:nvGrpSpPr>
+      <p:grpSpPr>
+        <a:xfrm>
+          <a:off x="0" y="0"/>
+          <a:ext cx="0" cy="0"/>
+          <a:chOff x="0" y="0"/>
+          <a:chExt cx="0" cy="0"/>
+        </a:xfrm>
+      </p:grpSpPr>
+      <p:sp>
+        <p:nvSpPr>
+          <p:cNvPr id="2" name="Title 1">
+            <a:extLst>
+              <a:ext uri="{FF2B5EF4-FFF2-40B4-BE49-F238E27FC236}">
                 <a16:creationId xmlns:a16="http://schemas.microsoft.com/office/drawing/2014/main" id="{7570F470-7D10-4577-90C0-0C461CC3DDEF}"/>
               </a:ext>
             </a:extLst>
@@ -4301,7 +4724,7 @@
 </p:sld>
 </file>
 
-<file path=ppt/slides/slide12.xml><?xml version="1.0" encoding="utf-8"?>
+<file path=ppt/slides/slide16.xml><?xml version="1.0" encoding="utf-8"?>
 <p:sld xmlns:a="http://schemas.openxmlformats.org/drawingml/2006/main" xmlns:r="http://schemas.openxmlformats.org/officeDocument/2006/relationships" xmlns:p="http://schemas.openxmlformats.org/presentationml/2006/main">
   <p:cSld>
     <p:spTree>
@@ -4692,7 +5115,7 @@
 </p:sld>
 </file>
 
-<file path=ppt/slides/slide13.xml><?xml version="1.0" encoding="utf-8"?>
+<file path=ppt/slides/slide17.xml><?xml version="1.0" encoding="utf-8"?>
 <p:sld xmlns:a="http://schemas.openxmlformats.org/drawingml/2006/main" xmlns:r="http://schemas.openxmlformats.org/officeDocument/2006/relationships" xmlns:p="http://schemas.openxmlformats.org/presentationml/2006/main">
   <p:cSld>
     <p:spTree>
@@ -4845,7 +5268,7 @@
 </p:sld>
 </file>
 
-<file path=ppt/slides/slide14.xml><?xml version="1.0" encoding="utf-8"?>
+<file path=ppt/slides/slide18.xml><?xml version="1.0" encoding="utf-8"?>
 <p:sld xmlns:a="http://schemas.openxmlformats.org/drawingml/2006/main" xmlns:r="http://schemas.openxmlformats.org/officeDocument/2006/relationships" xmlns:p="http://schemas.openxmlformats.org/presentationml/2006/main">
   <p:cSld>
     <p:spTree>
@@ -4919,8 +5342,8 @@
         </p:blipFill>
         <p:spPr>
           <a:xfrm>
-            <a:off x="3871867" y="2078345"/>
-            <a:ext cx="7602011" cy="3715268"/>
+            <a:off x="3241103" y="1770076"/>
+            <a:ext cx="8651244" cy="4228051"/>
           </a:xfrm>
           <a:prstGeom prst="rect">
             <a:avLst/>
@@ -5148,7 +5571,7 @@
 </p:sld>
 </file>
 
-<file path=ppt/slides/slide15.xml><?xml version="1.0" encoding="utf-8"?>
+<file path=ppt/slides/slide19.xml><?xml version="1.0" encoding="utf-8"?>
 <p:sld xmlns:a="http://schemas.openxmlformats.org/drawingml/2006/main" xmlns:r="http://schemas.openxmlformats.org/officeDocument/2006/relationships" xmlns:p="http://schemas.openxmlformats.org/presentationml/2006/main">
   <p:cSld>
     <p:spTree>
@@ -5416,6 +5839,135 @@
 </p:sld>
 </file>
 
+<file path=ppt/slides/slide20.xml><?xml version="1.0" encoding="utf-8"?>
+<p:sld xmlns:a="http://schemas.openxmlformats.org/drawingml/2006/main" xmlns:r="http://schemas.openxmlformats.org/officeDocument/2006/relationships" xmlns:p="http://schemas.openxmlformats.org/presentationml/2006/main">
+  <p:cSld>
+    <p:spTree>
+      <p:nvGrpSpPr>
+        <p:cNvPr id="1" name=""/>
+        <p:cNvGrpSpPr/>
+        <p:nvPr/>
+      </p:nvGrpSpPr>
+      <p:grpSpPr>
+        <a:xfrm>
+          <a:off x="0" y="0"/>
+          <a:ext cx="0" cy="0"/>
+          <a:chOff x="0" y="0"/>
+          <a:chExt cx="0" cy="0"/>
+        </a:xfrm>
+      </p:grpSpPr>
+      <p:sp>
+        <p:nvSpPr>
+          <p:cNvPr id="2" name="Title 1">
+            <a:extLst>
+              <a:ext uri="{FF2B5EF4-FFF2-40B4-BE49-F238E27FC236}">
+                <a16:creationId xmlns:a16="http://schemas.microsoft.com/office/drawing/2014/main" id="{26B07EF3-E32C-4513-A48C-C4E92ACC3A33}"/>
+              </a:ext>
+            </a:extLst>
+          </p:cNvPr>
+          <p:cNvSpPr>
+            <a:spLocks noGrp="1"/>
+          </p:cNvSpPr>
+          <p:nvPr>
+            <p:ph type="title"/>
+          </p:nvPr>
+        </p:nvSpPr>
+        <p:spPr/>
+        <p:txBody>
+          <a:bodyPr/>
+          <a:lstStyle/>
+          <a:p>
+            <a:r>
+              <a:rPr lang="en-CA" dirty="0"/>
+              <a:t>Wrapping Up</a:t>
+            </a:r>
+          </a:p>
+        </p:txBody>
+      </p:sp>
+      <p:sp>
+        <p:nvSpPr>
+          <p:cNvPr id="3" name="Content Placeholder 2">
+            <a:extLst>
+              <a:ext uri="{FF2B5EF4-FFF2-40B4-BE49-F238E27FC236}">
+                <a16:creationId xmlns:a16="http://schemas.microsoft.com/office/drawing/2014/main" id="{326E8C19-659F-46C8-9E76-DA9DD1660762}"/>
+              </a:ext>
+            </a:extLst>
+          </p:cNvPr>
+          <p:cNvSpPr>
+            <a:spLocks noGrp="1"/>
+          </p:cNvSpPr>
+          <p:nvPr>
+            <p:ph idx="1"/>
+          </p:nvPr>
+        </p:nvSpPr>
+        <p:spPr/>
+        <p:txBody>
+          <a:bodyPr>
+            <a:normAutofit lnSpcReduction="10000"/>
+          </a:bodyPr>
+          <a:lstStyle/>
+          <a:p>
+            <a:r>
+              <a:rPr lang="en-CA" dirty="0"/>
+              <a:t>How was the presentation?</a:t>
+            </a:r>
+          </a:p>
+          <a:p>
+            <a:endParaRPr lang="en-CA" dirty="0"/>
+          </a:p>
+          <a:p>
+            <a:r>
+              <a:rPr lang="en-CA" dirty="0"/>
+              <a:t>What are you taking away?</a:t>
+            </a:r>
+          </a:p>
+          <a:p>
+            <a:endParaRPr lang="en-CA" dirty="0"/>
+          </a:p>
+          <a:p>
+            <a:r>
+              <a:rPr lang="en-CA" dirty="0"/>
+              <a:t>What do you want to use in </a:t>
+            </a:r>
+            <a:r>
+              <a:rPr lang="en-CA"/>
+              <a:t>your workflow?</a:t>
+            </a:r>
+            <a:endParaRPr lang="en-CA" dirty="0"/>
+          </a:p>
+          <a:p>
+            <a:endParaRPr lang="en-CA" dirty="0"/>
+          </a:p>
+          <a:p>
+            <a:r>
+              <a:rPr lang="en-CA" dirty="0"/>
+              <a:t>Is this worth presenting in a lunch and learn?</a:t>
+            </a:r>
+          </a:p>
+          <a:p>
+            <a:endParaRPr lang="en-CA" dirty="0"/>
+          </a:p>
+          <a:p>
+            <a:r>
+              <a:rPr lang="en-CA" dirty="0"/>
+              <a:t>Other questions/comments?</a:t>
+            </a:r>
+          </a:p>
+        </p:txBody>
+      </p:sp>
+    </p:spTree>
+    <p:extLst>
+      <p:ext uri="{BB962C8B-B14F-4D97-AF65-F5344CB8AC3E}">
+        <p14:creationId xmlns:p14="http://schemas.microsoft.com/office/powerpoint/2010/main" val="3287525552"/>
+      </p:ext>
+    </p:extLst>
+  </p:cSld>
+  <p:clrMapOvr>
+    <a:masterClrMapping/>
+  </p:clrMapOvr>
+</p:sld>
+</file>
+
 <file path=ppt/slides/slide3.xml><?xml version="1.0" encoding="utf-8"?>
 <p:sld xmlns:a="http://schemas.openxmlformats.org/drawingml/2006/main" xmlns:r="http://schemas.openxmlformats.org/officeDocument/2006/relationships" xmlns:p="http://schemas.openxmlformats.org/presentationml/2006/main">
   <p:cSld>
@@ -5698,13 +6250,13 @@
         </p:nvSpPr>
         <p:spPr>
           <a:xfrm>
-            <a:off x="838200" y="1825625"/>
-            <a:ext cx="4452828" cy="4667250"/>
+            <a:off x="335560" y="1825625"/>
+            <a:ext cx="5159228" cy="4667250"/>
           </a:xfrm>
         </p:spPr>
         <p:txBody>
           <a:bodyPr>
-            <a:normAutofit/>
+            <a:normAutofit fontScale="92500"/>
           </a:bodyPr>
           <a:lstStyle/>
           <a:p>
@@ -5714,7 +6266,10 @@
             </a:r>
           </a:p>
           <a:p>
-            <a:endParaRPr lang="en-CA" dirty="0"/>
+            <a:r>
+              <a:rPr lang="en-CA" dirty="0"/>
+              <a:t>Required to use some Python 3.5+ features</a:t>
+            </a:r>
           </a:p>
           <a:p>
             <a:r>
@@ -5726,7 +6281,7 @@
             <a:pPr lvl="1"/>
             <a:r>
               <a:rPr lang="en-CA" i="1" dirty="0"/>
-              <a:t>There’s a reason most large projects use dynamically-typed languages!</a:t>
+              <a:t>There’s a reason most large projects use statically-typed languages!</a:t>
             </a:r>
           </a:p>
           <a:p>
@@ -5741,7 +6296,14 @@
             </a:r>
             <a:r>
               <a:rPr lang="en-CA" i="1" dirty="0"/>
-              <a:t> repos, catching ~15% of reported bugs.</a:t>
+              <a:t> repos, catching ~15% of reported bugs. </a:t>
+            </a:r>
+          </a:p>
+          <a:p>
+            <a:pPr lvl="2"/>
+            <a:r>
+              <a:rPr lang="en-CA" i="1" dirty="0"/>
+              <a:t>Adding types would be more or less helpful in other contexts.</a:t>
             </a:r>
           </a:p>
         </p:txBody>

</xml_diff>